<commit_message>
added model metrics file
</commit_message>
<xml_diff>
--- a/reporting/GMS GitHub Modeling Summary Layouts.pptx
+++ b/reporting/GMS GitHub Modeling Summary Layouts.pptx
@@ -128,6 +128,11 @@
       </a:defRPr>
     </a:lvl9pPr>
   </p:defaultTextStyle>
+  <p:extLst>
+    <p:ext uri="{EFAFB233-063F-42B5-8137-9DF3F51BA10A}">
+      <p15:sldGuideLst xmlns:p15="http://schemas.microsoft.com/office/powerpoint/2012/main"/>
+    </p:ext>
+  </p:extLst>
 </p:presentation>
 </file>
 
@@ -213,7 +218,7 @@
           <a:p>
             <a:fld id="{30EC18F4-5B17-40DF-9DE1-871691755494}" type="datetimeFigureOut">
               <a:rPr lang="en-US" smtClean="0"/>
-              <a:t>2/5/2024</a:t>
+              <a:t>2/13/2024</a:t>
             </a:fld>
             <a:endParaRPr lang="en-US"/>
           </a:p>
@@ -2024,7 +2029,7 @@
           <a:p>
             <a:fld id="{803A6DAB-104D-4A34-92C1-982EC081E5FE}" type="datetimeFigureOut">
               <a:rPr lang="en-US" smtClean="0"/>
-              <a:t>2/5/2024</a:t>
+              <a:t>2/13/2024</a:t>
             </a:fld>
             <a:endParaRPr lang="en-US"/>
           </a:p>
@@ -2222,7 +2227,7 @@
           <a:p>
             <a:fld id="{803A6DAB-104D-4A34-92C1-982EC081E5FE}" type="datetimeFigureOut">
               <a:rPr lang="en-US" smtClean="0"/>
-              <a:t>2/5/2024</a:t>
+              <a:t>2/13/2024</a:t>
             </a:fld>
             <a:endParaRPr lang="en-US"/>
           </a:p>
@@ -2430,7 +2435,7 @@
           <a:p>
             <a:fld id="{803A6DAB-104D-4A34-92C1-982EC081E5FE}" type="datetimeFigureOut">
               <a:rPr lang="en-US" smtClean="0"/>
-              <a:t>2/5/2024</a:t>
+              <a:t>2/13/2024</a:t>
             </a:fld>
             <a:endParaRPr lang="en-US"/>
           </a:p>
@@ -2628,7 +2633,7 @@
           <a:p>
             <a:fld id="{803A6DAB-104D-4A34-92C1-982EC081E5FE}" type="datetimeFigureOut">
               <a:rPr lang="en-US" smtClean="0"/>
-              <a:t>2/5/2024</a:t>
+              <a:t>2/13/2024</a:t>
             </a:fld>
             <a:endParaRPr lang="en-US"/>
           </a:p>
@@ -2903,7 +2908,7 @@
           <a:p>
             <a:fld id="{803A6DAB-104D-4A34-92C1-982EC081E5FE}" type="datetimeFigureOut">
               <a:rPr lang="en-US" smtClean="0"/>
-              <a:t>2/5/2024</a:t>
+              <a:t>2/13/2024</a:t>
             </a:fld>
             <a:endParaRPr lang="en-US"/>
           </a:p>
@@ -3168,7 +3173,7 @@
           <a:p>
             <a:fld id="{803A6DAB-104D-4A34-92C1-982EC081E5FE}" type="datetimeFigureOut">
               <a:rPr lang="en-US" smtClean="0"/>
-              <a:t>2/5/2024</a:t>
+              <a:t>2/13/2024</a:t>
             </a:fld>
             <a:endParaRPr lang="en-US"/>
           </a:p>
@@ -3580,7 +3585,7 @@
           <a:p>
             <a:fld id="{803A6DAB-104D-4A34-92C1-982EC081E5FE}" type="datetimeFigureOut">
               <a:rPr lang="en-US" smtClean="0"/>
-              <a:t>2/5/2024</a:t>
+              <a:t>2/13/2024</a:t>
             </a:fld>
             <a:endParaRPr lang="en-US"/>
           </a:p>
@@ -3721,7 +3726,7 @@
           <a:p>
             <a:fld id="{803A6DAB-104D-4A34-92C1-982EC081E5FE}" type="datetimeFigureOut">
               <a:rPr lang="en-US" smtClean="0"/>
-              <a:t>2/5/2024</a:t>
+              <a:t>2/13/2024</a:t>
             </a:fld>
             <a:endParaRPr lang="en-US"/>
           </a:p>
@@ -3834,7 +3839,7 @@
           <a:p>
             <a:fld id="{803A6DAB-104D-4A34-92C1-982EC081E5FE}" type="datetimeFigureOut">
               <a:rPr lang="en-US" smtClean="0"/>
-              <a:t>2/5/2024</a:t>
+              <a:t>2/13/2024</a:t>
             </a:fld>
             <a:endParaRPr lang="en-US"/>
           </a:p>
@@ -4145,7 +4150,7 @@
           <a:p>
             <a:fld id="{803A6DAB-104D-4A34-92C1-982EC081E5FE}" type="datetimeFigureOut">
               <a:rPr lang="en-US" smtClean="0"/>
-              <a:t>2/5/2024</a:t>
+              <a:t>2/13/2024</a:t>
             </a:fld>
             <a:endParaRPr lang="en-US"/>
           </a:p>
@@ -4433,7 +4438,7 @@
           <a:p>
             <a:fld id="{803A6DAB-104D-4A34-92C1-982EC081E5FE}" type="datetimeFigureOut">
               <a:rPr lang="en-US" smtClean="0"/>
-              <a:t>2/5/2024</a:t>
+              <a:t>2/13/2024</a:t>
             </a:fld>
             <a:endParaRPr lang="en-US"/>
           </a:p>
@@ -4674,7 +4679,7 @@
           <a:p>
             <a:fld id="{803A6DAB-104D-4A34-92C1-982EC081E5FE}" type="datetimeFigureOut">
               <a:rPr lang="en-US" smtClean="0"/>
-              <a:t>2/5/2024</a:t>
+              <a:t>2/13/2024</a:t>
             </a:fld>
             <a:endParaRPr lang="en-US"/>
           </a:p>
@@ -8502,7 +8507,7 @@
           <p:nvPr>
             <p:extLst>
               <p:ext uri="{D42A27DB-BD31-4B8C-83A1-F6EECF244321}">
-                <p14:modId xmlns:p14="http://schemas.microsoft.com/office/powerpoint/2010/main" val="2567534188"/>
+                <p14:modId xmlns:p14="http://schemas.microsoft.com/office/powerpoint/2010/main" val="3162455994"/>
               </p:ext>
             </p:extLst>
           </p:nvPr>

</xml_diff>